<commit_message>
update auto mapper study, profile and DI
</commit_message>
<xml_diff>
--- a/WpfStudy/Documents/AutoMapper Tutorial.pptx
+++ b/WpfStudy/Documents/AutoMapper Tutorial.pptx
@@ -13,8 +13,8 @@
     <p:sldId id="262" r:id="rId6"/>
     <p:sldId id="265" r:id="rId7"/>
     <p:sldId id="264" r:id="rId8"/>
-    <p:sldId id="278" r:id="rId9"/>
-    <p:sldId id="257" r:id="rId10"/>
+    <p:sldId id="257" r:id="rId9"/>
+    <p:sldId id="278" r:id="rId10"/>
     <p:sldId id="266" r:id="rId11"/>
     <p:sldId id="267" r:id="rId12"/>
     <p:sldId id="258" r:id="rId13"/>
@@ -25,6 +25,8 @@
     <p:sldId id="270" r:id="rId18"/>
     <p:sldId id="276" r:id="rId19"/>
     <p:sldId id="277" r:id="rId20"/>
+    <p:sldId id="291" r:id="rId21"/>
+    <p:sldId id="290" r:id="rId22"/>
   </p:sldIdLst>
   <p:sldSz cx="12192000" cy="6858000"/>
   <p:notesSz cx="6858000" cy="9144000"/>
@@ -5430,6 +5432,428 @@
 </p:sld>
 </file>
 
+<file path=ppt/slides/slide18.xml><?xml version="1.0" encoding="utf-8"?>
+<p:sld xmlns:a="http://schemas.openxmlformats.org/drawingml/2006/main" xmlns:r="http://schemas.openxmlformats.org/officeDocument/2006/relationships" xmlns:p="http://schemas.openxmlformats.org/presentationml/2006/main">
+  <p:cSld>
+    <p:spTree>
+      <p:nvGrpSpPr>
+        <p:cNvPr id="1" name=""/>
+        <p:cNvGrpSpPr/>
+        <p:nvPr/>
+      </p:nvGrpSpPr>
+      <p:grpSpPr/>
+      <p:sp>
+        <p:nvSpPr>
+          <p:cNvPr id="2" name="Title 1"/>
+          <p:cNvSpPr>
+            <a:spLocks noGrp="1"/>
+          </p:cNvSpPr>
+          <p:nvPr>
+            <p:ph type="title"/>
+          </p:nvPr>
+        </p:nvSpPr>
+        <p:spPr/>
+        <p:txBody>
+          <a:bodyPr>
+            <a:normAutofit fontScale="90000"/>
+          </a:bodyPr>
+          <a:p>
+            <a:r>
+              <a:rPr lang="en-US"/>
+              <a:t>Profile : IProfileExpressionInternal, IProfileExpression, IProfileConfiguration</a:t>
+            </a:r>
+            <a:endParaRPr lang="en-US"/>
+          </a:p>
+        </p:txBody>
+      </p:sp>
+      <p:sp>
+        <p:nvSpPr>
+          <p:cNvPr id="3" name="Content Placeholder 2"/>
+          <p:cNvSpPr>
+            <a:spLocks noGrp="1"/>
+          </p:cNvSpPr>
+          <p:nvPr>
+            <p:ph idx="1"/>
+          </p:nvPr>
+        </p:nvSpPr>
+        <p:spPr/>
+        <p:txBody>
+          <a:bodyPr>
+            <a:normAutofit fontScale="80000"/>
+          </a:bodyPr>
+          <a:p>
+            <a:r>
+              <a:rPr lang="en-US"/>
+              <a:t>Doi tượng profile la base class ben trong no co chua </a:t>
+            </a:r>
+            <a:r>
+              <a:rPr lang="en-US">
+                <a:sym typeface="+mn-ea"/>
+              </a:rPr>
+              <a:t>IProfileExpression va IProfileConfiguration</a:t>
+            </a:r>
+            <a:endParaRPr lang="en-US">
+              <a:sym typeface="+mn-ea"/>
+            </a:endParaRPr>
+          </a:p>
+          <a:p>
+            <a:r>
+              <a:rPr lang="en-US"/>
+              <a:t>Chung ta kg can khai bao </a:t>
+            </a:r>
+            <a:r>
+              <a:rPr lang="en-US">
+                <a:sym typeface="+mn-ea"/>
+              </a:rPr>
+              <a:t>MapperConfiguration</a:t>
+            </a:r>
+            <a:r>
+              <a:rPr lang="en-US"/>
+              <a:t> nhu thong thuong ma dung lenh sau</a:t>
+            </a:r>
+            <a:endParaRPr lang="en-US"/>
+          </a:p>
+          <a:p>
+            <a:pPr marL="457200" lvl="1" indent="0">
+              <a:buNone/>
+            </a:pPr>
+            <a:r>
+              <a:rPr lang="en-US"/>
+              <a:t>CreateMap&lt;Address, AddressDTO&gt;()</a:t>
+            </a:r>
+            <a:endParaRPr lang="en-US"/>
+          </a:p>
+          <a:p>
+            <a:pPr marL="457200" lvl="1" indent="0">
+              <a:buNone/>
+            </a:pPr>
+            <a:r>
+              <a:rPr lang="en-US"/>
+              <a:t>                .ForMember(dest=&gt;dest.State,act=&gt;act.MapFrom(src=&gt;src.Stae))=&gt; CreateMap la 1 extention no se du dung MappingConfiguration</a:t>
+            </a:r>
+            <a:endParaRPr lang="en-US"/>
+          </a:p>
+          <a:p>
+            <a:pPr marL="228600" lvl="1" algn="l">
+              <a:spcBef>
+                <a:spcPts val="1000"/>
+              </a:spcBef>
+              <a:buClrTx/>
+              <a:buSzTx/>
+            </a:pPr>
+            <a:r>
+              <a:rPr lang="en-US" sz="2800"/>
+              <a:t>so sanh voi cach thuc kg dung profile nhu sau</a:t>
+            </a:r>
+            <a:endParaRPr lang="en-US" sz="2800"/>
+          </a:p>
+          <a:p>
+            <a:pPr marL="228600" lvl="1" indent="0" algn="l">
+              <a:spcBef>
+                <a:spcPts val="500"/>
+              </a:spcBef>
+              <a:buClrTx/>
+              <a:buSzTx/>
+              <a:buNone/>
+            </a:pPr>
+            <a:r>
+              <a:rPr lang="en-US" sz="2400"/>
+              <a:t> var config = new MapperConfiguration(cfg =&gt;{                </a:t>
+            </a:r>
+            <a:endParaRPr lang="en-US" sz="2400"/>
+          </a:p>
+          <a:p>
+            <a:pPr marL="228600" lvl="1" indent="0" algn="l">
+              <a:spcBef>
+                <a:spcPts val="500"/>
+              </a:spcBef>
+              <a:buClrTx/>
+              <a:buSzTx/>
+              <a:buNone/>
+            </a:pPr>
+            <a:r>
+              <a:rPr lang="en-US" sz="2400"/>
+              <a:t>                cfg.CreateMap&lt;Employee, EmployeeDTO2&gt;()</a:t>
+            </a:r>
+            <a:endParaRPr lang="en-US" sz="2400"/>
+          </a:p>
+          <a:p>
+            <a:pPr marL="228600" lvl="1" indent="0" algn="l">
+              <a:spcBef>
+                <a:spcPts val="500"/>
+              </a:spcBef>
+              <a:buClrTx/>
+              <a:buSzTx/>
+              <a:buNone/>
+            </a:pPr>
+            <a:r>
+              <a:rPr lang="en-US" sz="2400"/>
+              <a:t>                .ForMember(dest =&gt; dest.City, act =&gt; act.MapFrom(src =&gt; src.Address.City))</a:t>
+            </a:r>
+            <a:endParaRPr lang="en-US" sz="2400"/>
+          </a:p>
+          <a:p>
+            <a:pPr marL="228600" lvl="1" indent="0" algn="l">
+              <a:spcBef>
+                <a:spcPts val="500"/>
+              </a:spcBef>
+              <a:buClrTx/>
+              <a:buSzTx/>
+              <a:buNone/>
+            </a:pPr>
+            <a:r>
+              <a:rPr lang="en-US" sz="2400"/>
+              <a:t>                .ForMember(dest =&gt; dest.Country, act =&gt; act.MapFrom(src =&gt; src.Address.Country))</a:t>
+            </a:r>
+            <a:endParaRPr lang="en-US" sz="2400"/>
+          </a:p>
+          <a:p>
+            <a:pPr marL="228600" lvl="1" indent="0" algn="l">
+              <a:spcBef>
+                <a:spcPts val="500"/>
+              </a:spcBef>
+              <a:buClrTx/>
+              <a:buSzTx/>
+              <a:buNone/>
+            </a:pPr>
+            <a:r>
+              <a:rPr lang="en-US" sz="2400"/>
+              <a:t>                .ForMember(dest =&gt; dest.State, act = act.MapFrom(src =&gt; src.Address.Stae));      });</a:t>
+            </a:r>
+            <a:endParaRPr lang="en-US" sz="2400"/>
+          </a:p>
+        </p:txBody>
+      </p:sp>
+    </p:spTree>
+  </p:cSld>
+  <p:clrMapOvr>
+    <a:masterClrMapping/>
+  </p:clrMapOvr>
+</p:sld>
+</file>
+
+<file path=ppt/slides/slide19.xml><?xml version="1.0" encoding="utf-8"?>
+<p:sld xmlns:a="http://schemas.openxmlformats.org/drawingml/2006/main" xmlns:r="http://schemas.openxmlformats.org/officeDocument/2006/relationships" xmlns:p="http://schemas.openxmlformats.org/presentationml/2006/main">
+  <p:cSld>
+    <p:spTree>
+      <p:nvGrpSpPr>
+        <p:cNvPr id="1" name=""/>
+        <p:cNvGrpSpPr/>
+        <p:nvPr/>
+      </p:nvGrpSpPr>
+      <p:grpSpPr/>
+      <p:sp>
+        <p:nvSpPr>
+          <p:cNvPr id="2" name="Title 1"/>
+          <p:cNvSpPr>
+            <a:spLocks noGrp="1"/>
+          </p:cNvSpPr>
+          <p:nvPr>
+            <p:ph type="title"/>
+          </p:nvPr>
+        </p:nvSpPr>
+        <p:spPr/>
+        <p:txBody>
+          <a:bodyPr/>
+          <a:p>
+            <a:r>
+              <a:rPr lang="en-US"/>
+              <a:t>Auto Mapper and DI</a:t>
+            </a:r>
+            <a:endParaRPr lang="en-US"/>
+          </a:p>
+        </p:txBody>
+      </p:sp>
+      <p:sp>
+        <p:nvSpPr>
+          <p:cNvPr id="3" name="Content Placeholder 2"/>
+          <p:cNvSpPr>
+            <a:spLocks noGrp="1"/>
+          </p:cNvSpPr>
+          <p:nvPr>
+            <p:ph idx="1"/>
+          </p:nvPr>
+        </p:nvSpPr>
+        <p:spPr/>
+        <p:txBody>
+          <a:bodyPr>
+            <a:normAutofit fontScale="90000" lnSpcReduction="20000"/>
+          </a:bodyPr>
+          <a:p>
+            <a:pPr marL="0" indent="0">
+              <a:buNone/>
+            </a:pPr>
+            <a:r>
+              <a:rPr lang="en-US"/>
+              <a:t>Mapper dc add vao trong DI container nhu sau</a:t>
+            </a:r>
+            <a:endParaRPr lang="en-US"/>
+          </a:p>
+          <a:p>
+            <a:r>
+              <a:rPr lang="en-US"/>
+              <a:t> services.AddSingleton(mapper);=&gt; mapper co the dc tạo ra từ MapperConfiguration nhu sau </a:t>
+            </a:r>
+            <a:br>
+              <a:rPr lang="en-US"/>
+            </a:br>
+            <a:endParaRPr lang="en-US"/>
+          </a:p>
+          <a:p>
+            <a:pPr marL="457200" lvl="1" indent="0">
+              <a:buNone/>
+            </a:pPr>
+            <a:r>
+              <a:rPr lang="en-US" sz="2055">
+                <a:solidFill>
+                  <a:srgbClr val="FF0000"/>
+                </a:solidFill>
+              </a:rPr>
+              <a:t>var mapperConfig = new MapperConfiguration(mc =&gt;</a:t>
+            </a:r>
+            <a:endParaRPr lang="en-US" sz="2055">
+              <a:solidFill>
+                <a:srgbClr val="FF0000"/>
+              </a:solidFill>
+            </a:endParaRPr>
+          </a:p>
+          <a:p>
+            <a:pPr marL="457200" lvl="1" indent="0">
+              <a:buNone/>
+            </a:pPr>
+            <a:r>
+              <a:rPr lang="en-US" sz="2055">
+                <a:solidFill>
+                  <a:srgbClr val="FF0000"/>
+                </a:solidFill>
+              </a:rPr>
+              <a:t>     {</a:t>
+            </a:r>
+            <a:endParaRPr lang="en-US" sz="2055">
+              <a:solidFill>
+                <a:srgbClr val="FF0000"/>
+              </a:solidFill>
+            </a:endParaRPr>
+          </a:p>
+          <a:p>
+            <a:pPr marL="457200" lvl="1" indent="0">
+              <a:buNone/>
+            </a:pPr>
+            <a:r>
+              <a:rPr lang="en-US" sz="2055">
+                <a:solidFill>
+                  <a:srgbClr val="FF0000"/>
+                </a:solidFill>
+              </a:rPr>
+              <a:t>         mc.AddProfile(new MappingProfile());</a:t>
+            </a:r>
+            <a:endParaRPr lang="en-US" sz="2055">
+              <a:solidFill>
+                <a:srgbClr val="FF0000"/>
+              </a:solidFill>
+            </a:endParaRPr>
+          </a:p>
+          <a:p>
+            <a:pPr marL="457200" lvl="1" indent="0">
+              <a:buNone/>
+            </a:pPr>
+            <a:r>
+              <a:rPr lang="en-US" sz="2055">
+                <a:solidFill>
+                  <a:srgbClr val="FF0000"/>
+                </a:solidFill>
+              </a:rPr>
+              <a:t>     });</a:t>
+            </a:r>
+            <a:endParaRPr lang="en-US" sz="2055">
+              <a:solidFill>
+                <a:srgbClr val="FF0000"/>
+              </a:solidFill>
+            </a:endParaRPr>
+          </a:p>
+          <a:p>
+            <a:pPr marL="457200" lvl="1" indent="0">
+              <a:buNone/>
+            </a:pPr>
+            <a:r>
+              <a:rPr lang="en-US" sz="2055">
+                <a:solidFill>
+                  <a:srgbClr val="FF0000"/>
+                </a:solidFill>
+              </a:rPr>
+              <a:t> IMapper mapper = mapperConfig.CreateMapper();</a:t>
+            </a:r>
+            <a:endParaRPr lang="en-US" sz="2055">
+              <a:solidFill>
+                <a:srgbClr val="FF0000"/>
+              </a:solidFill>
+            </a:endParaRPr>
+          </a:p>
+          <a:p>
+            <a:pPr marL="457200" lvl="1" indent="0">
+              <a:buNone/>
+            </a:pPr>
+            <a:endParaRPr lang="en-US" sz="2055">
+              <a:solidFill>
+                <a:schemeClr val="accent2">
+                  <a:lumMod val="75000"/>
+                </a:schemeClr>
+              </a:solidFill>
+              <a:highlight>
+                <a:srgbClr val="00FF00"/>
+              </a:highlight>
+            </a:endParaRPr>
+          </a:p>
+          <a:p>
+            <a:pPr marL="0" lvl="1" algn="l">
+              <a:spcBef>
+                <a:spcPts val="1000"/>
+              </a:spcBef>
+              <a:buClrTx/>
+              <a:buSzTx/>
+              <a:buNone/>
+            </a:pPr>
+            <a:r>
+              <a:rPr lang="en-US" sz="2800" b="1"/>
+              <a:t>Note: </a:t>
+            </a:r>
+            <a:endParaRPr lang="en-US" sz="2800"/>
+          </a:p>
+          <a:p>
+            <a:pPr marL="0" lvl="1" indent="0" algn="l">
+              <a:spcBef>
+                <a:spcPts val="1000"/>
+              </a:spcBef>
+              <a:buClrTx/>
+              <a:buSzTx/>
+              <a:buNone/>
+            </a:pPr>
+            <a:r>
+              <a:rPr lang="en-US" sz="2800"/>
+              <a:t>Mapper thì cần mapper MapConfiguration, mapper co the tao ra tu </a:t>
+            </a:r>
+            <a:r>
+              <a:rPr lang="en-US" sz="2800">
+                <a:sym typeface="+mn-ea"/>
+              </a:rPr>
+              <a:t>MapConfiguration</a:t>
+            </a:r>
+            <a:r>
+              <a:rPr lang="en-US" sz="2800"/>
+              <a:t>.CreateMap(),hoac new Mapper(mapConfig), bang cach nao thi mapper cung chua map config, ngoai ra </a:t>
+            </a:r>
+            <a:endParaRPr lang="en-US" sz="2800"/>
+          </a:p>
+        </p:txBody>
+      </p:sp>
+    </p:spTree>
+  </p:cSld>
+  <p:clrMapOvr>
+    <a:masterClrMapping/>
+  </p:clrMapOvr>
+</p:sld>
+</file>
+
 <file path=ppt/slides/slide2.xml><?xml version="1.0" encoding="utf-8"?>
 <p:sld xmlns:a="http://schemas.openxmlformats.org/drawingml/2006/main" xmlns:r="http://schemas.openxmlformats.org/officeDocument/2006/relationships" xmlns:p="http://schemas.openxmlformats.org/presentationml/2006/main">
   <p:cSld>
@@ -5488,6 +5912,55 @@
                 <a:sym typeface="+mn-ea"/>
               </a:rPr>
               <a:t>Auto Mapper WHAT-WHY</a:t>
+            </a:r>
+            <a:endParaRPr lang="en-US">
+              <a:sym typeface="+mn-ea"/>
+            </a:endParaRPr>
+          </a:p>
+          <a:p>
+            <a:r>
+              <a:rPr lang="en-US"/>
+              <a:t>Các tình huống(Ucase) sử dụng AutoMapping </a:t>
+            </a:r>
+            <a:endParaRPr lang="en-US"/>
+          </a:p>
+          <a:p>
+            <a:pPr lvl="1"/>
+            <a:r>
+              <a:rPr lang="en-US"/>
+              <a:t>Simple: all property type and Name the same</a:t>
+            </a:r>
+            <a:endParaRPr lang="en-US"/>
+          </a:p>
+          <a:p>
+            <a:pPr lvl="1"/>
+            <a:r>
+              <a:rPr lang="en-US"/>
+              <a:t>Different Name, Type of property between source and destination</a:t>
+            </a:r>
+            <a:endParaRPr lang="en-US"/>
+          </a:p>
+          <a:p>
+            <a:pPr lvl="1"/>
+            <a:r>
+              <a:rPr lang="en-US"/>
+              <a:t>Ignore property, condition </a:t>
+            </a:r>
+            <a:endParaRPr lang="en-US"/>
+          </a:p>
+          <a:p>
+            <a:pPr lvl="1"/>
+            <a:r>
+              <a:rPr lang="en-US"/>
+              <a:t>Use FixValue</a:t>
+            </a:r>
+            <a:endParaRPr lang="en-US"/>
+          </a:p>
+          <a:p>
+            <a:pPr lvl="1"/>
+            <a:r>
+              <a:rPr lang="en-US"/>
+              <a:t>Use ResolveValue</a:t>
             </a:r>
             <a:endParaRPr lang="en-US"/>
           </a:p>
@@ -5867,7 +6340,7 @@
           <a:p>
             <a:r>
               <a:rPr lang="en-US"/>
-              <a:t>Tổ chức Mapping</a:t>
+              <a:t>Auto Mapper WHAT-WHY</a:t>
             </a:r>
             <a:endParaRPr lang="en-US"/>
           </a:p>
@@ -5886,48 +6359,35 @@
         <p:spPr/>
         <p:txBody>
           <a:bodyPr>
-            <a:normAutofit fontScale="90000" lnSpcReduction="10000"/>
+            <a:normAutofit fontScale="90000"/>
           </a:bodyPr>
           <a:p>
             <a:r>
               <a:rPr lang="en-US"/>
-              <a:t>Dự án thu viện (BLL) Mapping từ Data from DAL về BO thuộc BLL nhằm mục đích đọc data từ CSDL vào BO va chuyển BO vào trong CSDL</a:t>
-            </a:r>
-            <a:endParaRPr lang="en-US"/>
-          </a:p>
-          <a:p>
-            <a:r>
-              <a:rPr lang="en-US"/>
-              <a:t>File LogicMappingProfile ben trong chứa các lớp EmployeeProfile, OutletProfile</a:t>
-            </a:r>
-            <a:endParaRPr lang="en-US"/>
-          </a:p>
-          <a:p>
-            <a:r>
-              <a:rPr lang="en-US"/>
-              <a:t>Dự án giao diện (MVC, MVVM,..vv) mapping từ Logic object thành các ViewModel object, hoặc chuyển data từ ViewModel thanh Logic object (sau do chuyển tiếp di đến CSDL)</a:t>
-            </a:r>
-            <a:endParaRPr lang="en-US"/>
-          </a:p>
-          <a:p>
-            <a:r>
-              <a:rPr lang="en-US"/>
-              <a:t>File ViewModelMapping chua ben trong cac lop EmployeeVMProfile</a:t>
-            </a:r>
-            <a:endParaRPr lang="en-US"/>
-          </a:p>
-          <a:p>
-            <a:r>
-              <a:rPr lang="en-US"/>
-              <a:t>Sau khi du an Logic hay UI start no se doc tat ca mapping vao trong config, va tra ra doi tuong mapping</a:t>
-            </a:r>
-            <a:endParaRPr lang="en-US"/>
-          </a:p>
-          <a:p>
-            <a:r>
-              <a:rPr lang="en-US"/>
-              <a:t> KQ: doi tuong mapping thuc hien viec copy data qua lai giua 2 loai kieu du lieu</a:t>
-            </a:r>
+              <a:t>Auto Mapper: Là cách thức chuyển data từ 1 đối tượng này qua dt khac (The AutoMapper is a mapper between two objects....It maps the properties of two different objects by transforming the input object of one type to the output object of another type.)</a:t>
+            </a:r>
+            <a:endParaRPr lang="en-US"/>
+          </a:p>
+          <a:p>
+            <a:r>
+              <a:rPr lang="en-US">
+                <a:sym typeface="+mn-ea"/>
+              </a:rPr>
+              <a:t>WHY: Từ mô hình 3 lớp dễ nhận thấy ở mỗi layer ta có 1 kiểu dữ liệu khác nhau(class) khác nhau về tên, kiểu dl, và so luong thuộc tính ex: View layer-&gt; CompanyVM,BLL layer-&gt; Company, DAL layer-&gt; CompanyDTO (data transfer object) or CompanyData</a:t>
+            </a:r>
+            <a:endParaRPr lang="en-US"/>
+          </a:p>
+          <a:p>
+            <a:r>
+              <a:rPr lang="en-US"/>
+              <a:t>Nhu cầu về chuyển dịch data là bắt buộc phải có. Nếu chung ta tự viết thì sẽ kg thể nào H% bằng  Auto Mapper , nó ngày càng hoàn thiện các chức năng và các ngoại lệ</a:t>
+            </a:r>
+            <a:endParaRPr lang="en-US"/>
+          </a:p>
+          <a:p>
+            <a:pPr marL="0" indent="0">
+              <a:buNone/>
+            </a:pPr>
             <a:endParaRPr lang="en-US"/>
           </a:p>
         </p:txBody>
@@ -5966,7 +6426,7 @@
           <a:p>
             <a:r>
               <a:rPr lang="en-US"/>
-              <a:t>Auto Mapper WHAT-WHY</a:t>
+              <a:t>Tổ chức Mapping</a:t>
             </a:r>
             <a:endParaRPr lang="en-US"/>
           </a:p>
@@ -5984,32 +6444,35 @@
         </p:nvSpPr>
         <p:spPr/>
         <p:txBody>
-          <a:bodyPr/>
-          <a:p>
-            <a:r>
-              <a:rPr lang="en-US"/>
-              <a:t>What is Auto Mapper: Là cách thức chuyển data từ 1 đối tượng này qua dt khac (The AutoMapper is a mapper between two objects....It maps the properties of two different objects by transforming the input object of one type to the output object of another type.)</a:t>
-            </a:r>
-            <a:endParaRPr lang="en-US"/>
-          </a:p>
-          <a:p>
-            <a:r>
-              <a:rPr lang="en-US"/>
-              <a:t>Why we use Auto Mapper: Nhu cầu về auto mapper là bắt buộc phải có, Đặc biệt trong kiến trúc mô hình 3 layer, khi mà mỗi layer sẽ có data type (class) khác nhau về tên, kiểu dl, và so luong thuộc tính</a:t>
-            </a:r>
-            <a:endParaRPr lang="en-US"/>
-          </a:p>
-          <a:p>
-            <a:r>
-              <a:rPr lang="en-US"/>
-              <a:t>Nếu chung ta tự viết thì sẽ kg thể nào h% bằng team đã viết ra Auto Mapper , đặc biệt auto mapper ngày càng hoàn thiện các chức năng và các ngoại lệ</a:t>
-            </a:r>
-            <a:endParaRPr lang="en-US"/>
-          </a:p>
-          <a:p>
-            <a:pPr marL="0" indent="0">
-              <a:buNone/>
-            </a:pPr>
+          <a:bodyPr>
+            <a:normAutofit fontScale="70000"/>
+          </a:bodyPr>
+          <a:p>
+            <a:r>
+              <a:rPr lang="en-US"/>
+              <a:t>Với kiến trúc 3 layer ở trên, mỗi layer sẽ làm việc với 2 kiểu du liệu, thí dụ ở mô hình View, thì chủ yếu là mapping between ViewModel va Logic (model),  dự án BLL thì map between Logic object va Data Object... Mỗi dự án (view/logc) sẽ có 1 mapping Config, trong do chua cac mapping profile</a:t>
+            </a:r>
+            <a:endParaRPr lang="en-US"/>
+          </a:p>
+          <a:p>
+            <a:r>
+              <a:rPr lang="en-US"/>
+              <a:t>Dự án thu viện (BLL) Mapping từ Data from DAL về BO thuộc BLL nhằm mục đích đọc data từ CSDL vào BO va chuyển BO vào trong CSDL=&gt; LogicMapping, ex: File LogicMappingProfile ben trong chứa các lớp EmployeeProfile, OutletProfile</a:t>
+            </a:r>
+            <a:endParaRPr lang="en-US"/>
+          </a:p>
+          <a:p>
+            <a:r>
+              <a:rPr lang="en-US"/>
+              <a:t>Dự án giao diện (MVC, MVVM,..vv) mapping từ Logic object thành các ViewModel object, hoặc chuyển data từ ViewModel thanh Logic object (sau do chuyển tiếp di đến CSDL),ex: File ViewModelMapping chua ben trong cac lop EmployeeVMProfile</a:t>
+            </a:r>
+            <a:endParaRPr lang="en-US"/>
+          </a:p>
+          <a:p>
+            <a:r>
+              <a:rPr lang="en-US"/>
+              <a:t>Sau khi du an Logic hay UI start no se doc tat ca mapping vao trong config, va tra ra doi tuong mapper. KQ: doi tuong mapping thuc hien viec copy data qua lai giua 2 loai kieu du lieu</a:t>
+            </a:r>
             <a:endParaRPr lang="en-US"/>
           </a:p>
         </p:txBody>
@@ -6079,7 +6542,7 @@
           <a:p>
             <a:r>
               <a:rPr lang="en-US"/>
-              <a:t>Method Map&lt;DestinationType(Source data) --&gt; destinationData se copy tu sourcedata thanh destination Data</a:t>
+              <a:t>Đối tượng IMapper, hoac đối tượng tĩnh Mapper, Method Mapper.Map&lt;DestinationType(Source data) --&gt; destinationData se copy tu sourcedata thanh destination Data</a:t>
             </a:r>
             <a:endParaRPr lang="en-US"/>
           </a:p>

</xml_diff>